<commit_message>
create readme, edit manual
</commit_message>
<xml_diff>
--- a/manual/manual_template.pptx
+++ b/manual/manual_template.pptx
@@ -3059,7 +3059,7 @@
                   <a:srgbClr val="000000"/>
                 </a:solidFill>
               </a:rPr>
-              <a:t>30.07.2025</a:t>
+              <a:t>31.07.2025</a:t>
             </a:fld>
             <a:endParaRPr lang="de-DE" dirty="0">
               <a:solidFill>
@@ -4098,7 +4098,7 @@
                   <a:srgbClr val="000000"/>
                 </a:solidFill>
               </a:rPr>
-              <a:t>30.07.2025</a:t>
+              <a:t>31.07.2025</a:t>
             </a:fld>
             <a:endParaRPr lang="de-DE" dirty="0">
               <a:solidFill>
@@ -6252,7 +6252,7 @@
           <p:spPr>
             <a:xfrm>
               <a:off x="1124744" y="4233934"/>
-              <a:ext cx="1644863" cy="577081"/>
+              <a:ext cx="1644863" cy="415498"/>
             </a:xfrm>
             <a:prstGeom prst="rect">
               <a:avLst/>
@@ -6273,7 +6273,7 @@
             <a:p>
               <a:r>
                 <a:rPr lang="en-US" sz="1050" dirty="0"/>
-                <a:t>Pauses and resumes the game</a:t>
+                <a:t>Pause / Resume</a:t>
               </a:r>
             </a:p>
           </p:txBody>

</xml_diff>

<commit_message>
create readme, edit manual (#79)
</commit_message>
<xml_diff>
--- a/manual/manual_template.pptx
+++ b/manual/manual_template.pptx
@@ -3059,7 +3059,7 @@
                   <a:srgbClr val="000000"/>
                 </a:solidFill>
               </a:rPr>
-              <a:t>30.07.2025</a:t>
+              <a:t>31.07.2025</a:t>
             </a:fld>
             <a:endParaRPr lang="de-DE" dirty="0">
               <a:solidFill>
@@ -4098,7 +4098,7 @@
                   <a:srgbClr val="000000"/>
                 </a:solidFill>
               </a:rPr>
-              <a:t>30.07.2025</a:t>
+              <a:t>31.07.2025</a:t>
             </a:fld>
             <a:endParaRPr lang="de-DE" dirty="0">
               <a:solidFill>
@@ -6252,7 +6252,7 @@
           <p:spPr>
             <a:xfrm>
               <a:off x="1124744" y="4233934"/>
-              <a:ext cx="1644863" cy="577081"/>
+              <a:ext cx="1644863" cy="415498"/>
             </a:xfrm>
             <a:prstGeom prst="rect">
               <a:avLst/>
@@ -6273,7 +6273,7 @@
             <a:p>
               <a:r>
                 <a:rPr lang="en-US" sz="1050" dirty="0"/>
-                <a:t>Pauses and resumes the game</a:t>
+                <a:t>Pause / Resume</a:t>
               </a:r>
             </a:p>
           </p:txBody>

</xml_diff>